<commit_message>
added linear system equation
</commit_message>
<xml_diff>
--- a/Presentazione.pptx
+++ b/Presentazione.pptx
@@ -15,7 +15,7 @@
     <p:sldId id="258" r:id="rId6"/>
     <p:sldId id="311" r:id="rId7"/>
     <p:sldId id="313" r:id="rId8"/>
-    <p:sldId id="282" r:id="rId9"/>
+    <p:sldId id="326" r:id="rId9"/>
     <p:sldId id="315" r:id="rId10"/>
     <p:sldId id="314" r:id="rId11"/>
     <p:sldId id="321" r:id="rId12"/>
@@ -227,7 +227,7 @@
           <a:p>
             <a:fld id="{1BE83274-B678-44EA-BAF4-0AA32708275B}" type="datetimeFigureOut">
               <a:rPr lang="it-IT" smtClean="0"/>
-              <a:t>14/07/2023</a:t>
+              <a:t>17/07/2023</a:t>
             </a:fld>
             <a:endParaRPr lang="it-IT"/>
           </a:p>
@@ -637,7 +637,7 @@
           <a:p>
             <a:fld id="{1D8BD707-D9CF-40AE-B4C6-C98DA3205C09}" type="datetimeFigureOut">
               <a:rPr lang="en-US"/>
-              <a:t>7/14/2023</a:t>
+              <a:t>7/17/2023</a:t>
             </a:fld>
             <a:endParaRPr lang="en-US"/>
           </a:p>
@@ -814,7 +814,7 @@
           <a:p>
             <a:fld id="{1D8BD707-D9CF-40AE-B4C6-C98DA3205C09}" type="datetimeFigureOut">
               <a:rPr lang="en-US"/>
-              <a:t>7/14/2023</a:t>
+              <a:t>7/17/2023</a:t>
             </a:fld>
             <a:endParaRPr lang="en-US"/>
           </a:p>
@@ -1028,7 +1028,7 @@
           <a:p>
             <a:fld id="{1D8BD707-D9CF-40AE-B4C6-C98DA3205C09}" type="datetimeFigureOut">
               <a:rPr lang="en-US"/>
-              <a:t>7/14/2023</a:t>
+              <a:t>7/17/2023</a:t>
             </a:fld>
             <a:endParaRPr lang="en-US"/>
           </a:p>
@@ -1176,7 +1176,7 @@
           <a:p>
             <a:fld id="{1D8BD707-D9CF-40AE-B4C6-C98DA3205C09}" type="datetimeFigureOut">
               <a:rPr lang="en-US"/>
-              <a:t>7/14/2023</a:t>
+              <a:t>7/17/2023</a:t>
             </a:fld>
             <a:endParaRPr lang="en-US"/>
           </a:p>
@@ -1295,7 +1295,7 @@
           <a:p>
             <a:fld id="{1D8BD707-D9CF-40AE-B4C6-C98DA3205C09}" type="datetimeFigureOut">
               <a:rPr lang="en-US"/>
-              <a:t>7/14/2023</a:t>
+              <a:t>7/17/2023</a:t>
             </a:fld>
             <a:endParaRPr lang="en-US"/>
           </a:p>
@@ -1592,7 +1592,7 @@
           <a:p>
             <a:fld id="{1D8BD707-D9CF-40AE-B4C6-C98DA3205C09}" type="datetimeFigureOut">
               <a:rPr lang="en-US"/>
-              <a:t>7/14/2023</a:t>
+              <a:t>7/17/2023</a:t>
             </a:fld>
             <a:endParaRPr lang="en-US"/>
           </a:p>
@@ -2104,63 +2104,186 @@
           </a:p>
         </p:txBody>
       </p:sp>
-      <p:sp>
-        <p:nvSpPr>
-          <p:cNvPr id="3" name="Segnaposto testo 2">
+      <p:pic>
+        <p:nvPicPr>
+          <p:cNvPr id="6" name="Immagine 5">
             <a:extLst>
               <a:ext uri="{FF2B5EF4-FFF2-40B4-BE49-F238E27FC236}">
-                <a16:creationId xmlns:a16="http://schemas.microsoft.com/office/drawing/2014/main" id="{31694F71-4418-6177-EA70-856A063E0D4D}"/>
+                <a16:creationId xmlns:a16="http://schemas.microsoft.com/office/drawing/2014/main" id="{AE29C7F9-5340-D5B2-32F9-8780536E1713}"/>
               </a:ext>
             </a:extLst>
           </p:cNvPr>
-          <p:cNvSpPr>
-            <a:spLocks noGrp="1"/>
-          </p:cNvSpPr>
-          <p:nvPr>
-            <p:ph type="body" idx="1"/>
-          </p:nvPr>
-        </p:nvSpPr>
-        <p:spPr>
-          <a:xfrm>
-            <a:off x="914400" y="2057400"/>
-            <a:ext cx="8001000" cy="369332"/>
-          </a:xfrm>
-        </p:spPr>
-        <p:txBody>
-          <a:bodyPr/>
-          <a:lstStyle/>
-          <a:p>
-            <a:pPr marL="285750" indent="-285750" algn="l">
-              <a:spcAft>
-                <a:spcPts val="2400"/>
-              </a:spcAft>
-              <a:buFont typeface="Arial" panose="020B0604020202020204" pitchFamily="34" charset="0"/>
-              <a:buChar char="•"/>
-            </a:pPr>
-            <a:r>
-              <a:rPr lang="it-IT" kern="1200" dirty="0">
-                <a:latin typeface="Arial"/>
-                <a:cs typeface="Arial"/>
-              </a:rPr>
-              <a:t>DA mettere </a:t>
-            </a:r>
-            <a:r>
-              <a:rPr lang="it-IT" kern="1200" dirty="0" err="1">
-                <a:latin typeface="Arial"/>
-                <a:cs typeface="Arial"/>
-              </a:rPr>
-              <a:t>eq</a:t>
-            </a:r>
-            <a:r>
-              <a:rPr lang="it-IT" kern="1200" dirty="0">
-                <a:latin typeface="Arial"/>
-                <a:cs typeface="Arial"/>
-              </a:rPr>
-              <a:t>.</a:t>
-            </a:r>
-          </a:p>
-        </p:txBody>
-      </p:sp>
+          <p:cNvPicPr>
+            <a:picLocks noChangeAspect="1"/>
+          </p:cNvPicPr>
+          <p:nvPr/>
+        </p:nvPicPr>
+        <p:blipFill>
+          <a:blip r:embed="rId2"/>
+          <a:stretch>
+            <a:fillRect/>
+          </a:stretch>
+        </p:blipFill>
+        <p:spPr>
+          <a:xfrm>
+            <a:off x="879346" y="3403650"/>
+            <a:ext cx="4427604" cy="1158340"/>
+          </a:xfrm>
+          <a:prstGeom prst="rect">
+            <a:avLst/>
+          </a:prstGeom>
+        </p:spPr>
+      </p:pic>
+      <p:pic>
+        <p:nvPicPr>
+          <p:cNvPr id="10" name="Immagine 9">
+            <a:extLst>
+              <a:ext uri="{FF2B5EF4-FFF2-40B4-BE49-F238E27FC236}">
+                <a16:creationId xmlns:a16="http://schemas.microsoft.com/office/drawing/2014/main" id="{26072CA4-1836-9A01-1031-91771EA8D6D7}"/>
+              </a:ext>
+            </a:extLst>
+          </p:cNvPr>
+          <p:cNvPicPr>
+            <a:picLocks noChangeAspect="1"/>
+          </p:cNvPicPr>
+          <p:nvPr/>
+        </p:nvPicPr>
+        <p:blipFill>
+          <a:blip r:embed="rId3"/>
+          <a:stretch>
+            <a:fillRect/>
+          </a:stretch>
+        </p:blipFill>
+        <p:spPr>
+          <a:xfrm>
+            <a:off x="1031759" y="4594848"/>
+            <a:ext cx="4122777" cy="1486029"/>
+          </a:xfrm>
+          <a:prstGeom prst="rect">
+            <a:avLst/>
+          </a:prstGeom>
+        </p:spPr>
+      </p:pic>
+      <p:pic>
+        <p:nvPicPr>
+          <p:cNvPr id="12" name="Immagine 11">
+            <a:extLst>
+              <a:ext uri="{FF2B5EF4-FFF2-40B4-BE49-F238E27FC236}">
+                <a16:creationId xmlns:a16="http://schemas.microsoft.com/office/drawing/2014/main" id="{21FCC849-6E78-938C-7F21-56277C0A55C9}"/>
+              </a:ext>
+            </a:extLst>
+          </p:cNvPr>
+          <p:cNvPicPr>
+            <a:picLocks noChangeAspect="1"/>
+          </p:cNvPicPr>
+          <p:nvPr/>
+        </p:nvPicPr>
+        <p:blipFill>
+          <a:blip r:embed="rId4"/>
+          <a:stretch>
+            <a:fillRect/>
+          </a:stretch>
+        </p:blipFill>
+        <p:spPr>
+          <a:xfrm>
+            <a:off x="5380516" y="4514921"/>
+            <a:ext cx="2842506" cy="1371719"/>
+          </a:xfrm>
+          <a:prstGeom prst="rect">
+            <a:avLst/>
+          </a:prstGeom>
+        </p:spPr>
+      </p:pic>
+      <p:pic>
+        <p:nvPicPr>
+          <p:cNvPr id="14" name="Immagine 13">
+            <a:extLst>
+              <a:ext uri="{FF2B5EF4-FFF2-40B4-BE49-F238E27FC236}">
+                <a16:creationId xmlns:a16="http://schemas.microsoft.com/office/drawing/2014/main" id="{0BDEBB23-7576-6A3C-69CB-FF25E59C664E}"/>
+              </a:ext>
+            </a:extLst>
+          </p:cNvPr>
+          <p:cNvPicPr>
+            <a:picLocks noChangeAspect="1"/>
+          </p:cNvPicPr>
+          <p:nvPr/>
+        </p:nvPicPr>
+        <p:blipFill>
+          <a:blip r:embed="rId5"/>
+          <a:stretch>
+            <a:fillRect/>
+          </a:stretch>
+        </p:blipFill>
+        <p:spPr>
+          <a:xfrm>
+            <a:off x="8296588" y="4244297"/>
+            <a:ext cx="3589331" cy="701101"/>
+          </a:xfrm>
+          <a:prstGeom prst="rect">
+            <a:avLst/>
+          </a:prstGeom>
+        </p:spPr>
+      </p:pic>
+      <p:pic>
+        <p:nvPicPr>
+          <p:cNvPr id="18" name="Immagine 17">
+            <a:extLst>
+              <a:ext uri="{FF2B5EF4-FFF2-40B4-BE49-F238E27FC236}">
+                <a16:creationId xmlns:a16="http://schemas.microsoft.com/office/drawing/2014/main" id="{421D9252-436E-B3EB-626F-3595694671FF}"/>
+              </a:ext>
+            </a:extLst>
+          </p:cNvPr>
+          <p:cNvPicPr>
+            <a:picLocks noChangeAspect="1"/>
+          </p:cNvPicPr>
+          <p:nvPr/>
+        </p:nvPicPr>
+        <p:blipFill>
+          <a:blip r:embed="rId6"/>
+          <a:stretch>
+            <a:fillRect/>
+          </a:stretch>
+        </p:blipFill>
+        <p:spPr>
+          <a:xfrm>
+            <a:off x="879346" y="1015983"/>
+            <a:ext cx="9091448" cy="2080440"/>
+          </a:xfrm>
+          <a:prstGeom prst="rect">
+            <a:avLst/>
+          </a:prstGeom>
+        </p:spPr>
+      </p:pic>
+      <p:pic>
+        <p:nvPicPr>
+          <p:cNvPr id="20" name="Immagine 19">
+            <a:extLst>
+              <a:ext uri="{FF2B5EF4-FFF2-40B4-BE49-F238E27FC236}">
+                <a16:creationId xmlns:a16="http://schemas.microsoft.com/office/drawing/2014/main" id="{C67929D6-0717-0C68-683C-071BC0E14742}"/>
+              </a:ext>
+            </a:extLst>
+          </p:cNvPr>
+          <p:cNvPicPr>
+            <a:picLocks noChangeAspect="1"/>
+          </p:cNvPicPr>
+          <p:nvPr/>
+        </p:nvPicPr>
+        <p:blipFill>
+          <a:blip r:embed="rId7"/>
+          <a:stretch>
+            <a:fillRect/>
+          </a:stretch>
+        </p:blipFill>
+        <p:spPr>
+          <a:xfrm>
+            <a:off x="8582011" y="5007693"/>
+            <a:ext cx="2606266" cy="823031"/>
+          </a:xfrm>
+          <a:prstGeom prst="rect">
+            <a:avLst/>
+          </a:prstGeom>
+        </p:spPr>
+      </p:pic>
     </p:spTree>
     <p:extLst>
       <p:ext uri="{BB962C8B-B14F-4D97-AF65-F5344CB8AC3E}">
@@ -2284,6 +2407,126 @@
           </a:p>
         </p:txBody>
       </p:sp>
+      <p:pic>
+        <p:nvPicPr>
+          <p:cNvPr id="5" name="Immagine 4">
+            <a:extLst>
+              <a:ext uri="{FF2B5EF4-FFF2-40B4-BE49-F238E27FC236}">
+                <a16:creationId xmlns:a16="http://schemas.microsoft.com/office/drawing/2014/main" id="{12220262-DB64-A419-6F2B-AC771D6626B8}"/>
+              </a:ext>
+            </a:extLst>
+          </p:cNvPr>
+          <p:cNvPicPr>
+            <a:picLocks noChangeAspect="1"/>
+          </p:cNvPicPr>
+          <p:nvPr/>
+        </p:nvPicPr>
+        <p:blipFill>
+          <a:blip r:embed="rId2"/>
+          <a:stretch>
+            <a:fillRect/>
+          </a:stretch>
+        </p:blipFill>
+        <p:spPr>
+          <a:xfrm>
+            <a:off x="1037439" y="1219200"/>
+            <a:ext cx="9312447" cy="1828958"/>
+          </a:xfrm>
+          <a:prstGeom prst="rect">
+            <a:avLst/>
+          </a:prstGeom>
+        </p:spPr>
+      </p:pic>
+      <p:pic>
+        <p:nvPicPr>
+          <p:cNvPr id="7" name="Immagine 6">
+            <a:extLst>
+              <a:ext uri="{FF2B5EF4-FFF2-40B4-BE49-F238E27FC236}">
+                <a16:creationId xmlns:a16="http://schemas.microsoft.com/office/drawing/2014/main" id="{E7C72E9F-E12C-C984-FCBA-1FB3DF1543FC}"/>
+              </a:ext>
+            </a:extLst>
+          </p:cNvPr>
+          <p:cNvPicPr>
+            <a:picLocks noChangeAspect="1"/>
+          </p:cNvPicPr>
+          <p:nvPr/>
+        </p:nvPicPr>
+        <p:blipFill>
+          <a:blip r:embed="rId3"/>
+          <a:stretch>
+            <a:fillRect/>
+          </a:stretch>
+        </p:blipFill>
+        <p:spPr>
+          <a:xfrm>
+            <a:off x="1219200" y="3245819"/>
+            <a:ext cx="1082134" cy="1356478"/>
+          </a:xfrm>
+          <a:prstGeom prst="rect">
+            <a:avLst/>
+          </a:prstGeom>
+        </p:spPr>
+      </p:pic>
+      <p:pic>
+        <p:nvPicPr>
+          <p:cNvPr id="9" name="Immagine 8">
+            <a:extLst>
+              <a:ext uri="{FF2B5EF4-FFF2-40B4-BE49-F238E27FC236}">
+                <a16:creationId xmlns:a16="http://schemas.microsoft.com/office/drawing/2014/main" id="{52FDC305-1986-138F-E0EA-3CE39C406F16}"/>
+              </a:ext>
+            </a:extLst>
+          </p:cNvPr>
+          <p:cNvPicPr>
+            <a:picLocks noChangeAspect="1"/>
+          </p:cNvPicPr>
+          <p:nvPr/>
+        </p:nvPicPr>
+        <p:blipFill>
+          <a:blip r:embed="rId4"/>
+          <a:stretch>
+            <a:fillRect/>
+          </a:stretch>
+        </p:blipFill>
+        <p:spPr>
+          <a:xfrm>
+            <a:off x="2971800" y="3752593"/>
+            <a:ext cx="1577477" cy="342930"/>
+          </a:xfrm>
+          <a:prstGeom prst="rect">
+            <a:avLst/>
+          </a:prstGeom>
+        </p:spPr>
+      </p:pic>
+      <p:pic>
+        <p:nvPicPr>
+          <p:cNvPr id="11" name="Immagine 10">
+            <a:extLst>
+              <a:ext uri="{FF2B5EF4-FFF2-40B4-BE49-F238E27FC236}">
+                <a16:creationId xmlns:a16="http://schemas.microsoft.com/office/drawing/2014/main" id="{A82E627B-1831-CDF3-9161-336BC3F42D36}"/>
+              </a:ext>
+            </a:extLst>
+          </p:cNvPr>
+          <p:cNvPicPr>
+            <a:picLocks noChangeAspect="1"/>
+          </p:cNvPicPr>
+          <p:nvPr/>
+        </p:nvPicPr>
+        <p:blipFill>
+          <a:blip r:embed="rId5"/>
+          <a:stretch>
+            <a:fillRect/>
+          </a:stretch>
+        </p:blipFill>
+        <p:spPr>
+          <a:xfrm>
+            <a:off x="4857761" y="3752593"/>
+            <a:ext cx="723963" cy="251482"/>
+          </a:xfrm>
+          <a:prstGeom prst="rect">
+            <a:avLst/>
+          </a:prstGeom>
+        </p:spPr>
+      </p:pic>
     </p:spTree>
     <p:extLst>
       <p:ext uri="{BB962C8B-B14F-4D97-AF65-F5344CB8AC3E}">
@@ -2564,8 +2807,8 @@
           </a:p>
         </p:txBody>
       </p:sp>
-      <mc:AlternateContent xmlns:mc="http://schemas.openxmlformats.org/markup-compatibility/2006">
-        <mc:Choice xmlns:a14="http://schemas.microsoft.com/office/drawing/2010/main" Requires="a14">
+      <mc:AlternateContent xmlns:mc="http://schemas.openxmlformats.org/markup-compatibility/2006" xmlns:a14="http://schemas.microsoft.com/office/drawing/2010/main">
+        <mc:Choice Requires="a14">
           <p:sp>
             <p:nvSpPr>
               <p:cNvPr id="3" name="Segnaposto testo 2">
@@ -2632,7 +2875,7 @@
             </p:txBody>
           </p:sp>
         </mc:Choice>
-        <mc:Fallback>
+        <mc:Fallback xmlns="">
           <p:sp>
             <p:nvSpPr>
               <p:cNvPr id="3" name="Segnaposto testo 2">
@@ -2676,8 +2919,8 @@
           </p:sp>
         </mc:Fallback>
       </mc:AlternateContent>
-      <mc:AlternateContent xmlns:mc="http://schemas.openxmlformats.org/markup-compatibility/2006">
-        <mc:Choice xmlns:a14="http://schemas.microsoft.com/office/drawing/2010/main" Requires="a14">
+      <mc:AlternateContent xmlns:mc="http://schemas.openxmlformats.org/markup-compatibility/2006" xmlns:a14="http://schemas.microsoft.com/office/drawing/2010/main">
+        <mc:Choice Requires="a14">
           <p:sp>
             <p:nvSpPr>
               <p:cNvPr id="4" name="CasellaDiTesto 3">
@@ -2985,7 +3228,7 @@
             </p:txBody>
           </p:sp>
         </mc:Choice>
-        <mc:Fallback>
+        <mc:Fallback xmlns="">
           <p:sp>
             <p:nvSpPr>
               <p:cNvPr id="4" name="CasellaDiTesto 3">
@@ -5495,67 +5738,40 @@
           </a:p>
         </p:txBody>
       </p:sp>
-      <p:sp>
-        <p:nvSpPr>
-          <p:cNvPr id="3" name="Segnaposto testo 2">
+      <p:pic>
+        <p:nvPicPr>
+          <p:cNvPr id="9" name="Immagine 8">
             <a:extLst>
               <a:ext uri="{FF2B5EF4-FFF2-40B4-BE49-F238E27FC236}">
-                <a16:creationId xmlns:a16="http://schemas.microsoft.com/office/drawing/2014/main" id="{31694F71-4418-6177-EA70-856A063E0D4D}"/>
+                <a16:creationId xmlns:a16="http://schemas.microsoft.com/office/drawing/2014/main" id="{62947069-1062-7D40-023C-6FCC5974FBB9}"/>
               </a:ext>
             </a:extLst>
           </p:cNvPr>
-          <p:cNvSpPr>
-            <a:spLocks noGrp="1"/>
-          </p:cNvSpPr>
-          <p:nvPr>
-            <p:ph type="body" idx="1"/>
-          </p:nvPr>
-        </p:nvSpPr>
-        <p:spPr>
-          <a:xfrm>
-            <a:off x="914400" y="2057400"/>
-            <a:ext cx="8001000" cy="369332"/>
-          </a:xfrm>
-        </p:spPr>
-        <p:txBody>
-          <a:bodyPr/>
-          <a:lstStyle/>
-          <a:p>
-            <a:pPr marL="285750" indent="-285750" algn="l">
-              <a:spcAft>
-                <a:spcPts val="2400"/>
-              </a:spcAft>
-              <a:buFont typeface="Arial" panose="020B0604020202020204" pitchFamily="34" charset="0"/>
-              <a:buChar char="•"/>
-            </a:pPr>
-            <a:r>
-              <a:rPr lang="it-IT" kern="1200" dirty="0">
-                <a:latin typeface="Arial"/>
-                <a:cs typeface="Arial"/>
-              </a:rPr>
-              <a:t>DA mettere </a:t>
-            </a:r>
-            <a:r>
-              <a:rPr lang="it-IT" kern="1200" dirty="0" err="1">
-                <a:latin typeface="Arial"/>
-                <a:cs typeface="Arial"/>
-              </a:rPr>
-              <a:t>eq</a:t>
-            </a:r>
-            <a:r>
-              <a:rPr lang="it-IT" kern="1200" dirty="0">
-                <a:latin typeface="Arial"/>
-                <a:cs typeface="Arial"/>
-              </a:rPr>
-              <a:t>.</a:t>
-            </a:r>
-          </a:p>
-        </p:txBody>
-      </p:sp>
+          <p:cNvPicPr>
+            <a:picLocks noChangeAspect="1"/>
+          </p:cNvPicPr>
+          <p:nvPr/>
+        </p:nvPicPr>
+        <p:blipFill>
+          <a:blip r:embed="rId2"/>
+          <a:stretch>
+            <a:fillRect/>
+          </a:stretch>
+        </p:blipFill>
+        <p:spPr>
+          <a:xfrm>
+            <a:off x="1676400" y="1981200"/>
+            <a:ext cx="9114310" cy="1661304"/>
+          </a:xfrm>
+          <a:prstGeom prst="rect">
+            <a:avLst/>
+          </a:prstGeom>
+        </p:spPr>
+      </p:pic>
     </p:spTree>
     <p:extLst>
       <p:ext uri="{BB962C8B-B14F-4D97-AF65-F5344CB8AC3E}">
-        <p14:creationId xmlns:p14="http://schemas.microsoft.com/office/powerpoint/2010/main" val="1056791235"/>
+        <p14:creationId xmlns:p14="http://schemas.microsoft.com/office/powerpoint/2010/main" val="3574247822"/>
       </p:ext>
     </p:extLst>
   </p:cSld>
@@ -5620,61 +5836,299 @@
       </p:sp>
       <p:sp>
         <p:nvSpPr>
-          <p:cNvPr id="3" name="Segnaposto testo 2">
+          <p:cNvPr id="9" name="CasellaDiTesto 8">
             <a:extLst>
               <a:ext uri="{FF2B5EF4-FFF2-40B4-BE49-F238E27FC236}">
-                <a16:creationId xmlns:a16="http://schemas.microsoft.com/office/drawing/2014/main" id="{31694F71-4418-6177-EA70-856A063E0D4D}"/>
+                <a16:creationId xmlns:a16="http://schemas.microsoft.com/office/drawing/2014/main" id="{A6255A20-92E3-9A75-F179-7C2019632E67}"/>
               </a:ext>
             </a:extLst>
           </p:cNvPr>
-          <p:cNvSpPr>
-            <a:spLocks noGrp="1"/>
-          </p:cNvSpPr>
-          <p:nvPr>
-            <p:ph type="body" idx="1"/>
-          </p:nvPr>
+          <p:cNvSpPr txBox="1"/>
+          <p:nvPr/>
         </p:nvSpPr>
         <p:spPr>
           <a:xfrm>
-            <a:off x="914400" y="2057400"/>
-            <a:ext cx="8001000" cy="369332"/>
-          </a:xfrm>
+            <a:off x="842263" y="1447800"/>
+            <a:ext cx="5334000" cy="369332"/>
+          </a:xfrm>
+          <a:prstGeom prst="rect">
+            <a:avLst/>
+          </a:prstGeom>
+          <a:noFill/>
         </p:spPr>
         <p:txBody>
-          <a:bodyPr/>
+          <a:bodyPr wrap="square" rtlCol="0">
+            <a:spAutoFit/>
+          </a:bodyPr>
           <a:lstStyle/>
           <a:p>
-            <a:pPr marL="285750" indent="-285750" algn="l">
-              <a:spcAft>
-                <a:spcPts val="2400"/>
-              </a:spcAft>
-              <a:buFont typeface="Arial" panose="020B0604020202020204" pitchFamily="34" charset="0"/>
-              <a:buChar char="•"/>
-            </a:pPr>
-            <a:r>
-              <a:rPr lang="it-IT" kern="1200" dirty="0">
-                <a:latin typeface="Arial"/>
-                <a:cs typeface="Arial"/>
-              </a:rPr>
-              <a:t>DA mettere </a:t>
-            </a:r>
-            <a:r>
-              <a:rPr lang="it-IT" kern="1200" dirty="0" err="1">
-                <a:latin typeface="Arial"/>
-                <a:cs typeface="Arial"/>
-              </a:rPr>
-              <a:t>eq</a:t>
-            </a:r>
-            <a:r>
-              <a:rPr lang="it-IT" kern="1200" dirty="0">
-                <a:latin typeface="Arial"/>
-                <a:cs typeface="Arial"/>
-              </a:rPr>
-              <a:t>.</a:t>
+            <a:r>
+              <a:rPr lang="it-IT" dirty="0"/>
+              <a:t>Si vuole controllare il sistema nel punto di equilibrio:</a:t>
             </a:r>
           </a:p>
         </p:txBody>
       </p:sp>
+      <mc:AlternateContent xmlns:mc="http://schemas.openxmlformats.org/markup-compatibility/2006">
+        <mc:Choice xmlns:a14="http://schemas.microsoft.com/office/drawing/2010/main" Requires="a14">
+          <p:sp>
+            <p:nvSpPr>
+              <p:cNvPr id="12" name="CasellaDiTesto 11">
+                <a:extLst>
+                  <a:ext uri="{FF2B5EF4-FFF2-40B4-BE49-F238E27FC236}">
+                    <a16:creationId xmlns:a16="http://schemas.microsoft.com/office/drawing/2014/main" id="{182314B8-BFF1-8E7B-EEE8-CEB008FD715E}"/>
+                  </a:ext>
+                </a:extLst>
+              </p:cNvPr>
+              <p:cNvSpPr txBox="1"/>
+              <p:nvPr/>
+            </p:nvSpPr>
+            <p:spPr>
+              <a:xfrm>
+                <a:off x="847342" y="2438400"/>
+                <a:ext cx="6010657" cy="369332"/>
+              </a:xfrm>
+              <a:prstGeom prst="rect">
+                <a:avLst/>
+              </a:prstGeom>
+              <a:noFill/>
+            </p:spPr>
+            <p:txBody>
+              <a:bodyPr wrap="square" rtlCol="0">
+                <a:spAutoFit/>
+              </a:bodyPr>
+              <a:lstStyle/>
+              <a:p>
+                <a:r>
+                  <a:rPr lang="en-GB" dirty="0"/>
+                  <a:t>L</a:t>
+                </a:r>
+                <a:r>
+                  <a:rPr lang="it-IT" dirty="0"/>
+                  <a:t>’ingresso di equilibrio </a:t>
+                </a:r>
+                <a14:m>
+                  <m:oMath xmlns:m="http://schemas.openxmlformats.org/officeDocument/2006/math">
+                    <m:acc>
+                      <m:accPr>
+                        <m:chr m:val="̅"/>
+                        <m:ctrlPr>
+                          <a:rPr lang="en-GB" b="0" i="1" smtClean="0">
+                            <a:latin typeface="Cambria Math" panose="02040503050406030204" pitchFamily="18" charset="0"/>
+                          </a:rPr>
+                        </m:ctrlPr>
+                      </m:accPr>
+                      <m:e>
+                        <m:sSub>
+                          <m:sSubPr>
+                            <m:ctrlPr>
+                              <a:rPr lang="en-GB" b="0" i="1" smtClean="0">
+                                <a:latin typeface="Cambria Math" panose="02040503050406030204" pitchFamily="18" charset="0"/>
+                              </a:rPr>
+                            </m:ctrlPr>
+                          </m:sSubPr>
+                          <m:e>
+                            <m:r>
+                              <a:rPr lang="en-GB" b="0" i="1" smtClean="0">
+                                <a:latin typeface="Cambria Math" panose="02040503050406030204" pitchFamily="18" charset="0"/>
+                              </a:rPr>
+                              <m:t>𝑇</m:t>
+                            </m:r>
+                          </m:e>
+                          <m:sub>
+                            <m:r>
+                              <a:rPr lang="en-GB" b="0" i="1" smtClean="0">
+                                <a:latin typeface="Cambria Math" panose="02040503050406030204" pitchFamily="18" charset="0"/>
+                              </a:rPr>
+                              <m:t>𝑟</m:t>
+                            </m:r>
+                          </m:sub>
+                        </m:sSub>
+                      </m:e>
+                    </m:acc>
+                  </m:oMath>
+                </a14:m>
+                <a:r>
+                  <a:rPr lang="it-IT" dirty="0"/>
+                  <a:t> si ottiene dalla terza equazione:</a:t>
+                </a:r>
+              </a:p>
+            </p:txBody>
+          </p:sp>
+        </mc:Choice>
+        <mc:Fallback>
+          <p:sp>
+            <p:nvSpPr>
+              <p:cNvPr id="12" name="CasellaDiTesto 11">
+                <a:extLst>
+                  <a:ext uri="{FF2B5EF4-FFF2-40B4-BE49-F238E27FC236}">
+                    <a16:creationId xmlns:a16="http://schemas.microsoft.com/office/drawing/2014/main" id="{182314B8-BFF1-8E7B-EEE8-CEB008FD715E}"/>
+                  </a:ext>
+                </a:extLst>
+              </p:cNvPr>
+              <p:cNvSpPr txBox="1">
+                <a:spLocks noRot="1" noChangeAspect="1" noMove="1" noResize="1" noEditPoints="1" noAdjustHandles="1" noChangeArrowheads="1" noChangeShapeType="1" noTextEdit="1"/>
+              </p:cNvSpPr>
+              <p:nvPr/>
+            </p:nvSpPr>
+            <p:spPr>
+              <a:xfrm>
+                <a:off x="847342" y="2438400"/>
+                <a:ext cx="6010657" cy="369332"/>
+              </a:xfrm>
+              <a:prstGeom prst="rect">
+                <a:avLst/>
+              </a:prstGeom>
+              <a:blipFill>
+                <a:blip r:embed="rId2"/>
+                <a:stretch>
+                  <a:fillRect l="-811" t="-8197" b="-24590"/>
+                </a:stretch>
+              </a:blipFill>
+            </p:spPr>
+            <p:txBody>
+              <a:bodyPr/>
+              <a:lstStyle/>
+              <a:p>
+                <a:r>
+                  <a:rPr lang="it-IT">
+                    <a:noFill/>
+                  </a:rPr>
+                  <a:t> </a:t>
+                </a:r>
+              </a:p>
+            </p:txBody>
+          </p:sp>
+        </mc:Fallback>
+      </mc:AlternateContent>
+      <p:pic>
+        <p:nvPicPr>
+          <p:cNvPr id="16" name="Immagine 15">
+            <a:extLst>
+              <a:ext uri="{FF2B5EF4-FFF2-40B4-BE49-F238E27FC236}">
+                <a16:creationId xmlns:a16="http://schemas.microsoft.com/office/drawing/2014/main" id="{ACA1B1F1-A521-63AE-EC89-D8D0A9AF1A7F}"/>
+              </a:ext>
+            </a:extLst>
+          </p:cNvPr>
+          <p:cNvPicPr>
+            <a:picLocks noChangeAspect="1"/>
+          </p:cNvPicPr>
+          <p:nvPr/>
+        </p:nvPicPr>
+        <p:blipFill>
+          <a:blip r:embed="rId3"/>
+          <a:stretch>
+            <a:fillRect/>
+          </a:stretch>
+        </p:blipFill>
+        <p:spPr>
+          <a:xfrm>
+            <a:off x="6477000" y="2984043"/>
+            <a:ext cx="2941575" cy="784928"/>
+          </a:xfrm>
+          <a:prstGeom prst="rect">
+            <a:avLst/>
+          </a:prstGeom>
+        </p:spPr>
+      </p:pic>
+      <p:sp>
+        <p:nvSpPr>
+          <p:cNvPr id="17" name="CasellaDiTesto 16">
+            <a:extLst>
+              <a:ext uri="{FF2B5EF4-FFF2-40B4-BE49-F238E27FC236}">
+                <a16:creationId xmlns:a16="http://schemas.microsoft.com/office/drawing/2014/main" id="{427774D8-A596-EEB9-4B80-BCD52D968CA3}"/>
+              </a:ext>
+            </a:extLst>
+          </p:cNvPr>
+          <p:cNvSpPr txBox="1"/>
+          <p:nvPr/>
+        </p:nvSpPr>
+        <p:spPr>
+          <a:xfrm>
+            <a:off x="842263" y="3680937"/>
+            <a:ext cx="6010657" cy="646331"/>
+          </a:xfrm>
+          <a:prstGeom prst="rect">
+            <a:avLst/>
+          </a:prstGeom>
+          <a:noFill/>
+        </p:spPr>
+        <p:txBody>
+          <a:bodyPr wrap="square" rtlCol="0">
+            <a:spAutoFit/>
+          </a:bodyPr>
+          <a:lstStyle/>
+          <a:p>
+            <a:r>
+              <a:rPr lang="en-GB" dirty="0"/>
+              <a:t>Da cui:</a:t>
+            </a:r>
+          </a:p>
+          <a:p>
+            <a:endParaRPr lang="it-IT" dirty="0"/>
+          </a:p>
+        </p:txBody>
+      </p:sp>
+      <p:pic>
+        <p:nvPicPr>
+          <p:cNvPr id="21" name="Immagine 20">
+            <a:extLst>
+              <a:ext uri="{FF2B5EF4-FFF2-40B4-BE49-F238E27FC236}">
+                <a16:creationId xmlns:a16="http://schemas.microsoft.com/office/drawing/2014/main" id="{84B4FB87-DEB0-0ADC-2CE9-AD88C7AE784F}"/>
+              </a:ext>
+            </a:extLst>
+          </p:cNvPr>
+          <p:cNvPicPr>
+            <a:picLocks noChangeAspect="1"/>
+          </p:cNvPicPr>
+          <p:nvPr/>
+        </p:nvPicPr>
+        <p:blipFill>
+          <a:blip r:embed="rId4"/>
+          <a:stretch>
+            <a:fillRect/>
+          </a:stretch>
+        </p:blipFill>
+        <p:spPr>
+          <a:xfrm>
+            <a:off x="6477000" y="900882"/>
+            <a:ext cx="2781541" cy="1463167"/>
+          </a:xfrm>
+          <a:prstGeom prst="rect">
+            <a:avLst/>
+          </a:prstGeom>
+        </p:spPr>
+      </p:pic>
+      <p:pic>
+        <p:nvPicPr>
+          <p:cNvPr id="23" name="Immagine 22">
+            <a:extLst>
+              <a:ext uri="{FF2B5EF4-FFF2-40B4-BE49-F238E27FC236}">
+                <a16:creationId xmlns:a16="http://schemas.microsoft.com/office/drawing/2014/main" id="{5552E3D9-88B9-12AC-C05B-168F361985BC}"/>
+              </a:ext>
+            </a:extLst>
+          </p:cNvPr>
+          <p:cNvPicPr>
+            <a:picLocks noChangeAspect="1"/>
+          </p:cNvPicPr>
+          <p:nvPr/>
+        </p:nvPicPr>
+        <p:blipFill>
+          <a:blip r:embed="rId5"/>
+          <a:stretch>
+            <a:fillRect/>
+          </a:stretch>
+        </p:blipFill>
+        <p:spPr>
+          <a:xfrm>
+            <a:off x="6705600" y="4113889"/>
+            <a:ext cx="1531753" cy="426757"/>
+          </a:xfrm>
+          <a:prstGeom prst="rect">
+            <a:avLst/>
+          </a:prstGeom>
+        </p:spPr>
+      </p:pic>
     </p:spTree>
     <p:extLst>
       <p:ext uri="{BB962C8B-B14F-4D97-AF65-F5344CB8AC3E}">

</xml_diff>